<commit_message>
Edited names in intro slide from power point
</commit_message>
<xml_diff>
--- a/ProjectPPT.pptx
+++ b/ProjectPPT.pptx
@@ -335,7 +335,8 @@
           <a:p>
             <a:fld id="{891E0010-B0D1-49E3-8435-10962E01AE18}" type="datetimeFigureOut">
               <a:rPr lang="en-US" smtClean="0"/>
-              <a:t>11/29/2018</a:t>
+              <a:pPr/>
+              <a:t>12/4/2018</a:t>
             </a:fld>
             <a:endParaRPr lang="en-US"/>
           </a:p>
@@ -399,6 +400,7 @@
           <a:p>
             <a:fld id="{4DD669B8-FCD8-4FFA-8E54-E01A2EB04F97}" type="slidenum">
               <a:rPr lang="en-US" smtClean="0"/>
+              <a:pPr/>
               <a:t>‹#›</a:t>
             </a:fld>
             <a:endParaRPr lang="en-US"/>
@@ -522,7 +524,8 @@
           <a:p>
             <a:fld id="{891E0010-B0D1-49E3-8435-10962E01AE18}" type="datetimeFigureOut">
               <a:rPr lang="en-US" smtClean="0"/>
-              <a:t>11/29/2018</a:t>
+              <a:pPr/>
+              <a:t>12/4/2018</a:t>
             </a:fld>
             <a:endParaRPr lang="en-US"/>
           </a:p>
@@ -564,6 +567,7 @@
           <a:p>
             <a:fld id="{4DD669B8-FCD8-4FFA-8E54-E01A2EB04F97}" type="slidenum">
               <a:rPr lang="en-US" smtClean="0"/>
+              <a:pPr/>
               <a:t>‹#›</a:t>
             </a:fld>
             <a:endParaRPr lang="en-US"/>
@@ -697,7 +701,8 @@
           <a:p>
             <a:fld id="{891E0010-B0D1-49E3-8435-10962E01AE18}" type="datetimeFigureOut">
               <a:rPr lang="en-US" smtClean="0"/>
-              <a:t>11/29/2018</a:t>
+              <a:pPr/>
+              <a:t>12/4/2018</a:t>
             </a:fld>
             <a:endParaRPr lang="en-US"/>
           </a:p>
@@ -739,6 +744,7 @@
           <a:p>
             <a:fld id="{4DD669B8-FCD8-4FFA-8E54-E01A2EB04F97}" type="slidenum">
               <a:rPr lang="en-US" smtClean="0"/>
+              <a:pPr/>
               <a:t>‹#›</a:t>
             </a:fld>
             <a:endParaRPr lang="en-US"/>
@@ -877,7 +883,8 @@
           <a:p>
             <a:fld id="{891E0010-B0D1-49E3-8435-10962E01AE18}" type="datetimeFigureOut">
               <a:rPr lang="en-US" smtClean="0"/>
-              <a:t>11/29/2018</a:t>
+              <a:pPr/>
+              <a:t>12/4/2018</a:t>
             </a:fld>
             <a:endParaRPr lang="en-US"/>
           </a:p>
@@ -924,6 +931,7 @@
           <a:p>
             <a:fld id="{4DD669B8-FCD8-4FFA-8E54-E01A2EB04F97}" type="slidenum">
               <a:rPr lang="en-US" smtClean="0"/>
+              <a:pPr/>
               <a:t>‹#›</a:t>
             </a:fld>
             <a:endParaRPr lang="en-US"/>
@@ -1124,7 +1132,8 @@
           <a:p>
             <a:fld id="{891E0010-B0D1-49E3-8435-10962E01AE18}" type="datetimeFigureOut">
               <a:rPr lang="en-US" smtClean="0"/>
-              <a:t>11/29/2018</a:t>
+              <a:pPr/>
+              <a:t>12/4/2018</a:t>
             </a:fld>
             <a:endParaRPr lang="en-US"/>
           </a:p>
@@ -1176,6 +1185,7 @@
           <a:p>
             <a:fld id="{4DD669B8-FCD8-4FFA-8E54-E01A2EB04F97}" type="slidenum">
               <a:rPr lang="en-US" smtClean="0"/>
+              <a:pPr/>
               <a:t>‹#›</a:t>
             </a:fld>
             <a:endParaRPr lang="en-US"/>
@@ -1598,7 +1608,8 @@
           <a:p>
             <a:fld id="{891E0010-B0D1-49E3-8435-10962E01AE18}" type="datetimeFigureOut">
               <a:rPr lang="en-US" smtClean="0"/>
-              <a:t>11/29/2018</a:t>
+              <a:pPr/>
+              <a:t>12/4/2018</a:t>
             </a:fld>
             <a:endParaRPr lang="en-US"/>
           </a:p>
@@ -1650,6 +1661,7 @@
           <a:p>
             <a:fld id="{4DD669B8-FCD8-4FFA-8E54-E01A2EB04F97}" type="slidenum">
               <a:rPr lang="en-US" smtClean="0"/>
+              <a:pPr/>
               <a:t>‹#›</a:t>
             </a:fld>
             <a:endParaRPr lang="en-US"/>
@@ -2013,7 +2025,8 @@
           <a:p>
             <a:fld id="{891E0010-B0D1-49E3-8435-10962E01AE18}" type="datetimeFigureOut">
               <a:rPr lang="en-US" smtClean="0"/>
-              <a:t>11/29/2018</a:t>
+              <a:pPr/>
+              <a:t>12/4/2018</a:t>
             </a:fld>
             <a:endParaRPr lang="en-US"/>
           </a:p>
@@ -2069,6 +2082,7 @@
           <a:p>
             <a:fld id="{4DD669B8-FCD8-4FFA-8E54-E01A2EB04F97}" type="slidenum">
               <a:rPr lang="en-US" smtClean="0"/>
+              <a:pPr/>
               <a:t>‹#›</a:t>
             </a:fld>
             <a:endParaRPr lang="en-US"/>
@@ -2144,7 +2158,8 @@
           <a:p>
             <a:fld id="{891E0010-B0D1-49E3-8435-10962E01AE18}" type="datetimeFigureOut">
               <a:rPr lang="en-US" smtClean="0"/>
-              <a:t>11/29/2018</a:t>
+              <a:pPr/>
+              <a:t>12/4/2018</a:t>
             </a:fld>
             <a:endParaRPr lang="en-US"/>
           </a:p>
@@ -2186,6 +2201,7 @@
           <a:p>
             <a:fld id="{4DD669B8-FCD8-4FFA-8E54-E01A2EB04F97}" type="slidenum">
               <a:rPr lang="en-US" smtClean="0"/>
+              <a:pPr/>
               <a:t>‹#›</a:t>
             </a:fld>
             <a:endParaRPr lang="en-US"/>
@@ -2239,7 +2255,8 @@
           <a:p>
             <a:fld id="{891E0010-B0D1-49E3-8435-10962E01AE18}" type="datetimeFigureOut">
               <a:rPr lang="en-US" smtClean="0"/>
-              <a:t>11/29/2018</a:t>
+              <a:pPr/>
+              <a:t>12/4/2018</a:t>
             </a:fld>
             <a:endParaRPr lang="en-US"/>
           </a:p>
@@ -2291,6 +2308,7 @@
           <a:p>
             <a:fld id="{4DD669B8-FCD8-4FFA-8E54-E01A2EB04F97}" type="slidenum">
               <a:rPr lang="en-US" smtClean="0"/>
+              <a:pPr/>
               <a:t>‹#›</a:t>
             </a:fld>
             <a:endParaRPr lang="en-US"/>
@@ -2517,7 +2535,8 @@
           <a:p>
             <a:fld id="{891E0010-B0D1-49E3-8435-10962E01AE18}" type="datetimeFigureOut">
               <a:rPr lang="en-US" smtClean="0"/>
-              <a:t>11/29/2018</a:t>
+              <a:pPr/>
+              <a:t>12/4/2018</a:t>
             </a:fld>
             <a:endParaRPr lang="en-US"/>
           </a:p>
@@ -2577,6 +2596,7 @@
           <a:p>
             <a:fld id="{4DD669B8-FCD8-4FFA-8E54-E01A2EB04F97}" type="slidenum">
               <a:rPr lang="en-US" smtClean="0"/>
+              <a:pPr/>
               <a:t>‹#›</a:t>
             </a:fld>
             <a:endParaRPr lang="en-US"/>
@@ -2769,7 +2789,8 @@
           <a:p>
             <a:fld id="{891E0010-B0D1-49E3-8435-10962E01AE18}" type="datetimeFigureOut">
               <a:rPr lang="en-US" smtClean="0"/>
-              <a:t>11/29/2018</a:t>
+              <a:pPr/>
+              <a:t>12/4/2018</a:t>
             </a:fld>
             <a:endParaRPr lang="en-US"/>
           </a:p>
@@ -2829,6 +2850,7 @@
           <a:p>
             <a:fld id="{4DD669B8-FCD8-4FFA-8E54-E01A2EB04F97}" type="slidenum">
               <a:rPr lang="en-US" smtClean="0"/>
+              <a:pPr/>
               <a:t>‹#›</a:t>
             </a:fld>
             <a:endParaRPr lang="en-US"/>
@@ -3141,7 +3163,8 @@
           <a:p>
             <a:fld id="{891E0010-B0D1-49E3-8435-10962E01AE18}" type="datetimeFigureOut">
               <a:rPr lang="en-US" smtClean="0"/>
-              <a:t>11/29/2018</a:t>
+              <a:pPr/>
+              <a:t>12/4/2018</a:t>
             </a:fld>
             <a:endParaRPr lang="en-US"/>
           </a:p>
@@ -3215,6 +3238,7 @@
           <a:p>
             <a:fld id="{4DD669B8-FCD8-4FFA-8E54-E01A2EB04F97}" type="slidenum">
               <a:rPr lang="en-US" smtClean="0"/>
+              <a:pPr/>
               <a:t>‹#›</a:t>
             </a:fld>
             <a:endParaRPr lang="en-US"/>
@@ -3600,15 +3624,27 @@
           <a:p>
             <a:r>
               <a:rPr lang="en-US" dirty="0" smtClean="0"/>
-              <a:t>By: Mercedes, </a:t>
-            </a:r>
+              <a:t>By: </a:t>
+            </a:r>
+            <a:r>
+              <a:rPr lang="en-US" dirty="0" smtClean="0"/>
+              <a:t>Mercedes Kent </a:t>
+            </a:r>
+          </a:p>
+          <a:p>
             <a:r>
               <a:rPr lang="en-US" dirty="0" err="1" smtClean="0"/>
               <a:t>Tejash</a:t>
             </a:r>
             <a:r>
               <a:rPr lang="en-US" dirty="0" smtClean="0"/>
-              <a:t>, Jesse</a:t>
+              <a:t> Patel </a:t>
+            </a:r>
+          </a:p>
+          <a:p>
+            <a:r>
+              <a:rPr lang="en-US" smtClean="0"/>
+              <a:t>Jessie Wilkins</a:t>
             </a:r>
             <a:endParaRPr lang="en-US" dirty="0"/>
           </a:p>

</xml_diff>